<commit_message>
Update CIS 560 Final Project.pptx
Added Diagram to slideshow
</commit_message>
<xml_diff>
--- a/GamesLibrary/CIS 560 Final Project.pptx
+++ b/GamesLibrary/CIS 560 Final Project.pptx
@@ -8,7 +8,8 @@
     <p:sldId id="256" r:id="rId2"/>
     <p:sldId id="257" r:id="rId3"/>
     <p:sldId id="258" r:id="rId4"/>
-    <p:sldId id="259" r:id="rId5"/>
+    <p:sldId id="260" r:id="rId5"/>
+    <p:sldId id="259" r:id="rId6"/>
   </p:sldIdLst>
   <p:sldSz cx="12192000" cy="6858000"/>
   <p:notesSz cx="6858000" cy="9144000"/>
@@ -107,6 +108,11 @@
       </a:defRPr>
     </a:lvl9pPr>
   </p:defaultTextStyle>
+  <p:extLst>
+    <p:ext uri="{EFAFB233-063F-42B5-8137-9DF3F51BA10A}">
+      <p15:sldGuideLst xmlns:p15="http://schemas.microsoft.com/office/powerpoint/2012/main"/>
+    </p:ext>
+  </p:extLst>
 </p:presentation>
 </file>
 
@@ -6220,8 +6226,8 @@
         </p:nvSpPr>
         <p:spPr>
           <a:xfrm>
-            <a:off x="875201" y="2789765"/>
-            <a:ext cx="8946541" cy="2625614"/>
+            <a:off x="2346586" y="2705875"/>
+            <a:ext cx="6003771" cy="2625614"/>
           </a:xfrm>
         </p:spPr>
         <p:txBody>
@@ -6230,21 +6236,18 @@
           </a:bodyPr>
           <a:lstStyle/>
           <a:p>
-            <a:pPr algn="ctr"/>
             <a:r>
               <a:rPr lang="en-US" sz="4800" dirty="0"/>
               <a:t>Scott Mason</a:t>
             </a:r>
           </a:p>
           <a:p>
-            <a:pPr algn="ctr"/>
             <a:r>
               <a:rPr lang="en-US" sz="4800" dirty="0"/>
               <a:t>Zack Nelson</a:t>
             </a:r>
           </a:p>
           <a:p>
-            <a:pPr algn="ctr"/>
             <a:r>
               <a:rPr lang="en-US" sz="4800" dirty="0"/>
               <a:t>Fernando Velarde</a:t>
@@ -6350,6 +6353,7 @@
               <a:rPr lang="en-US" sz="4800" dirty="0"/>
               <a:t>Target Users</a:t>
             </a:r>
+            <a:endParaRPr lang="en-US" sz="4400" dirty="0"/>
           </a:p>
           <a:p>
             <a:r>
@@ -6373,6 +6377,106 @@
 </file>
 
 <file path=ppt/slides/slide4.xml><?xml version="1.0" encoding="utf-8"?>
+<p:sld xmlns:a="http://schemas.openxmlformats.org/drawingml/2006/main" xmlns:r="http://schemas.openxmlformats.org/officeDocument/2006/relationships" xmlns:p="http://schemas.openxmlformats.org/presentationml/2006/main">
+  <p:cSld>
+    <p:spTree>
+      <p:nvGrpSpPr>
+        <p:cNvPr id="1" name=""/>
+        <p:cNvGrpSpPr/>
+        <p:nvPr/>
+      </p:nvGrpSpPr>
+      <p:grpSpPr>
+        <a:xfrm>
+          <a:off x="0" y="0"/>
+          <a:ext cx="0" cy="0"/>
+          <a:chOff x="0" y="0"/>
+          <a:chExt cx="0" cy="0"/>
+        </a:xfrm>
+      </p:grpSpPr>
+      <p:sp>
+        <p:nvSpPr>
+          <p:cNvPr id="2" name="Title 1">
+            <a:extLst>
+              <a:ext uri="{FF2B5EF4-FFF2-40B4-BE49-F238E27FC236}">
+                <a16:creationId xmlns:a16="http://schemas.microsoft.com/office/drawing/2014/main" id="{2FA217E2-9EB5-4472-91EC-F39F26EDEA5A}"/>
+              </a:ext>
+            </a:extLst>
+          </p:cNvPr>
+          <p:cNvSpPr>
+            <a:spLocks noGrp="1"/>
+          </p:cNvSpPr>
+          <p:nvPr>
+            <p:ph type="title"/>
+          </p:nvPr>
+        </p:nvSpPr>
+        <p:spPr>
+          <a:xfrm>
+            <a:off x="646111" y="452718"/>
+            <a:ext cx="9404723" cy="1400530"/>
+          </a:xfrm>
+        </p:spPr>
+        <p:txBody>
+          <a:bodyPr/>
+          <a:lstStyle/>
+          <a:p>
+            <a:pPr algn="ctr"/>
+            <a:r>
+              <a:rPr lang="en-US" sz="7200"/>
+              <a:t>ERD</a:t>
+            </a:r>
+            <a:endParaRPr lang="en-US" sz="7200" dirty="0"/>
+          </a:p>
+        </p:txBody>
+      </p:sp>
+      <p:pic>
+        <p:nvPicPr>
+          <p:cNvPr id="6" name="Content Placeholder 5" descr="A close up of text on a white background&#10;&#10;Description automatically generated">
+            <a:extLst>
+              <a:ext uri="{FF2B5EF4-FFF2-40B4-BE49-F238E27FC236}">
+                <a16:creationId xmlns:a16="http://schemas.microsoft.com/office/drawing/2014/main" id="{4932CD9F-06FA-4629-91BD-956EF2DFCC20}"/>
+              </a:ext>
+            </a:extLst>
+          </p:cNvPr>
+          <p:cNvPicPr>
+            <a:picLocks noGrp="1" noChangeAspect="1"/>
+          </p:cNvPicPr>
+          <p:nvPr>
+            <p:ph idx="1"/>
+          </p:nvPr>
+        </p:nvPicPr>
+        <p:blipFill>
+          <a:blip r:embed="rId2">
+            <a:extLst>
+              <a:ext uri="{28A0092B-C50C-407E-A947-70E740481C1C}">
+                <a14:useLocalDpi xmlns:a14="http://schemas.microsoft.com/office/drawing/2010/main" val="0"/>
+              </a:ext>
+            </a:extLst>
+          </a:blip>
+          <a:stretch>
+            <a:fillRect/>
+          </a:stretch>
+        </p:blipFill>
+        <p:spPr>
+          <a:xfrm>
+            <a:off x="1219200" y="1632602"/>
+            <a:ext cx="8266545" cy="5079195"/>
+          </a:xfrm>
+        </p:spPr>
+      </p:pic>
+    </p:spTree>
+    <p:extLst>
+      <p:ext uri="{BB962C8B-B14F-4D97-AF65-F5344CB8AC3E}">
+        <p14:creationId xmlns:p14="http://schemas.microsoft.com/office/powerpoint/2010/main" val="1045233942"/>
+      </p:ext>
+    </p:extLst>
+  </p:cSld>
+  <p:clrMapOvr>
+    <a:masterClrMapping/>
+  </p:clrMapOvr>
+</p:sld>
+</file>
+
+<file path=ppt/slides/slide5.xml><?xml version="1.0" encoding="utf-8"?>
 <p:sld xmlns:a="http://schemas.openxmlformats.org/drawingml/2006/main" xmlns:r="http://schemas.openxmlformats.org/officeDocument/2006/relationships" xmlns:p="http://schemas.openxmlformats.org/presentationml/2006/main">
   <p:cSld>
     <p:spTree>

</xml_diff>